<commit_message>
Changed the link in the presentation
</commit_message>
<xml_diff>
--- a/Project_Checkpoint_2_submission/KNN_algorithm.pptx
+++ b/Project_Checkpoint_2_submission/KNN_algorithm.pptx
@@ -331,7 +331,7 @@
             <a:fld id="{B61BEF0D-F0BB-DE4B-95CE-6DB70DBA9567}" type="datetimeFigureOut">
               <a:rPr lang="en-US" dirty="0"/>
               <a:pPr/>
-              <a:t>11/15/20</a:t>
+              <a:t>11/16/20</a:t>
             </a:fld>
             <a:endParaRPr lang="en-US"/>
           </a:p>
@@ -670,7 +670,7 @@
             <a:fld id="{B61BEF0D-F0BB-DE4B-95CE-6DB70DBA9567}" type="datetimeFigureOut">
               <a:rPr lang="en-US" dirty="0"/>
               <a:pPr/>
-              <a:t>11/15/20</a:t>
+              <a:t>11/16/20</a:t>
             </a:fld>
             <a:endParaRPr lang="en-US"/>
           </a:p>
@@ -1072,7 +1072,7 @@
             <a:fld id="{B61BEF0D-F0BB-DE4B-95CE-6DB70DBA9567}" type="datetimeFigureOut">
               <a:rPr lang="en-US" dirty="0"/>
               <a:pPr/>
-              <a:t>11/15/20</a:t>
+              <a:t>11/16/20</a:t>
             </a:fld>
             <a:endParaRPr lang="en-US"/>
           </a:p>
@@ -1409,7 +1409,7 @@
             <a:fld id="{B61BEF0D-F0BB-DE4B-95CE-6DB70DBA9567}" type="datetimeFigureOut">
               <a:rPr lang="en-US" dirty="0"/>
               <a:pPr/>
-              <a:t>11/15/20</a:t>
+              <a:t>11/16/20</a:t>
             </a:fld>
             <a:endParaRPr lang="en-US"/>
           </a:p>
@@ -1730,7 +1730,7 @@
             <a:fld id="{B61BEF0D-F0BB-DE4B-95CE-6DB70DBA9567}" type="datetimeFigureOut">
               <a:rPr lang="en-US" dirty="0"/>
               <a:pPr/>
-              <a:t>11/15/20</a:t>
+              <a:t>11/16/20</a:t>
             </a:fld>
             <a:endParaRPr lang="en-US"/>
           </a:p>
@@ -2127,7 +2127,7 @@
             <a:fld id="{B61BEF0D-F0BB-DE4B-95CE-6DB70DBA9567}" type="datetimeFigureOut">
               <a:rPr lang="en-US" dirty="0"/>
               <a:pPr/>
-              <a:t>11/15/20</a:t>
+              <a:t>11/16/20</a:t>
             </a:fld>
             <a:endParaRPr lang="en-US"/>
           </a:p>
@@ -2384,7 +2384,7 @@
             <a:fld id="{B61BEF0D-F0BB-DE4B-95CE-6DB70DBA9567}" type="datetimeFigureOut">
               <a:rPr lang="en-US" dirty="0"/>
               <a:pPr/>
-              <a:t>11/15/20</a:t>
+              <a:t>11/16/20</a:t>
             </a:fld>
             <a:endParaRPr lang="en-US"/>
           </a:p>
@@ -2646,7 +2646,7 @@
             <a:fld id="{B61BEF0D-F0BB-DE4B-95CE-6DB70DBA9567}" type="datetimeFigureOut">
               <a:rPr lang="en-US" dirty="0"/>
               <a:pPr/>
-              <a:t>11/15/20</a:t>
+              <a:t>11/16/20</a:t>
             </a:fld>
             <a:endParaRPr lang="en-US"/>
           </a:p>
@@ -2908,7 +2908,7 @@
             <a:fld id="{B61BEF0D-F0BB-DE4B-95CE-6DB70DBA9567}" type="datetimeFigureOut">
               <a:rPr lang="en-US" dirty="0"/>
               <a:pPr/>
-              <a:t>11/15/20</a:t>
+              <a:t>11/16/20</a:t>
             </a:fld>
             <a:endParaRPr lang="en-US"/>
           </a:p>
@@ -3238,7 +3238,7 @@
             <a:fld id="{B61BEF0D-F0BB-DE4B-95CE-6DB70DBA9567}" type="datetimeFigureOut">
               <a:rPr lang="en-US" dirty="0"/>
               <a:pPr/>
-              <a:t>11/15/20</a:t>
+              <a:t>11/16/20</a:t>
             </a:fld>
             <a:endParaRPr lang="en-US"/>
           </a:p>
@@ -3560,7 +3560,7 @@
             <a:fld id="{B61BEF0D-F0BB-DE4B-95CE-6DB70DBA9567}" type="datetimeFigureOut">
               <a:rPr lang="en-US" dirty="0"/>
               <a:pPr/>
-              <a:t>11/15/20</a:t>
+              <a:t>11/16/20</a:t>
             </a:fld>
             <a:endParaRPr lang="en-US"/>
           </a:p>
@@ -4016,7 +4016,7 @@
             <a:fld id="{B61BEF0D-F0BB-DE4B-95CE-6DB70DBA9567}" type="datetimeFigureOut">
               <a:rPr lang="en-US" dirty="0"/>
               <a:pPr/>
-              <a:t>11/15/20</a:t>
+              <a:t>11/16/20</a:t>
             </a:fld>
             <a:endParaRPr lang="en-US"/>
           </a:p>
@@ -4222,7 +4222,7 @@
             <a:fld id="{B61BEF0D-F0BB-DE4B-95CE-6DB70DBA9567}" type="datetimeFigureOut">
               <a:rPr lang="en-US" dirty="0"/>
               <a:pPr/>
-              <a:t>11/15/20</a:t>
+              <a:t>11/16/20</a:t>
             </a:fld>
             <a:endParaRPr lang="en-US"/>
           </a:p>
@@ -4401,7 +4401,7 @@
             <a:fld id="{B61BEF0D-F0BB-DE4B-95CE-6DB70DBA9567}" type="datetimeFigureOut">
               <a:rPr lang="en-US" dirty="0"/>
               <a:pPr/>
-              <a:t>11/15/20</a:t>
+              <a:t>11/16/20</a:t>
             </a:fld>
             <a:endParaRPr lang="en-US"/>
           </a:p>
@@ -4734,7 +4734,7 @@
             <a:fld id="{B61BEF0D-F0BB-DE4B-95CE-6DB70DBA9567}" type="datetimeFigureOut">
               <a:rPr lang="en-US" dirty="0"/>
               <a:pPr/>
-              <a:t>11/15/20</a:t>
+              <a:t>11/16/20</a:t>
             </a:fld>
             <a:endParaRPr lang="en-US"/>
           </a:p>
@@ -5076,7 +5076,7 @@
             <a:fld id="{B61BEF0D-F0BB-DE4B-95CE-6DB70DBA9567}" type="datetimeFigureOut">
               <a:rPr lang="en-US" dirty="0"/>
               <a:pPr/>
-              <a:t>11/15/20</a:t>
+              <a:t>11/16/20</a:t>
             </a:fld>
             <a:endParaRPr lang="en-US"/>
           </a:p>
@@ -7193,7 +7193,7 @@
             <a:fld id="{B61BEF0D-F0BB-DE4B-95CE-6DB70DBA9567}" type="datetimeFigureOut">
               <a:rPr lang="en-US" dirty="0"/>
               <a:pPr/>
-              <a:t>11/15/20</a:t>
+              <a:t>11/16/20</a:t>
             </a:fld>
             <a:endParaRPr lang="en-US"/>
           </a:p>
@@ -9063,59 +9063,15 @@
               <a:buNone/>
             </a:pPr>
             <a:r>
-              <a:rPr lang="en-US" dirty="0">
+              <a:rPr lang="en-US">
                 <a:solidFill>
                   <a:srgbClr val="005EBC"/>
                 </a:solidFill>
                 <a:latin typeface="Helvetica" pitchFamily="2" charset="0"/>
+                <a:hlinkClick r:id="rId3"/>
               </a:rPr>
-              <a:t>https://</a:t>
-            </a:r>
-            <a:r>
-              <a:rPr lang="en-US" dirty="0" err="1">
-                <a:solidFill>
-                  <a:srgbClr val="005EBC"/>
-                </a:solidFill>
-                <a:latin typeface="Helvetica" pitchFamily="2" charset="0"/>
-              </a:rPr>
-              <a:t>github.com</a:t>
-            </a:r>
-            <a:r>
-              <a:rPr lang="en-US" dirty="0">
-                <a:solidFill>
-                  <a:srgbClr val="005EBC"/>
-                </a:solidFill>
-                <a:latin typeface="Helvetica" pitchFamily="2" charset="0"/>
-              </a:rPr>
-              <a:t>/</a:t>
-            </a:r>
-            <a:r>
-              <a:rPr lang="en-US" dirty="0" err="1">
-                <a:solidFill>
-                  <a:srgbClr val="005EBC"/>
-                </a:solidFill>
-                <a:latin typeface="Helvetica" pitchFamily="2" charset="0"/>
-              </a:rPr>
-              <a:t>monicabernard</a:t>
-            </a:r>
-            <a:r>
-              <a:rPr lang="en-US" dirty="0">
-                <a:solidFill>
-                  <a:srgbClr val="005EBC"/>
-                </a:solidFill>
-                <a:latin typeface="Helvetica" pitchFamily="2" charset="0"/>
-              </a:rPr>
-              <a:t>/CAP-5610_Machine-Learning.git </a:t>
-            </a:r>
-            <a:endParaRPr lang="en-US" dirty="0"/>
-          </a:p>
-          <a:p>
-            <a:pPr marL="0" indent="0">
-              <a:lnSpc>
-                <a:spcPct val="90000"/>
-              </a:lnSpc>
-              <a:buNone/>
-            </a:pPr>
+              <a:t>GitHub Link</a:t>
+            </a:r>
             <a:endParaRPr lang="en-US" dirty="0"/>
           </a:p>
           <a:p>
@@ -9153,7 +9109,7 @@
           <p:nvPr/>
         </p:nvPicPr>
         <p:blipFill>
-          <a:blip r:embed="rId3">
+          <a:blip r:embed="rId4">
             <a:extLst>
               <a:ext uri="{28A0092B-C50C-407E-A947-70E740481C1C}">
                 <a14:useLocalDpi xmlns:a14="http://schemas.microsoft.com/office/drawing/2010/main" val="0"/>
@@ -9406,7 +9362,7 @@
           <p:nvPr/>
         </p:nvPicPr>
         <p:blipFill>
-          <a:blip r:embed="rId4">
+          <a:blip r:embed="rId5">
             <a:extLst>
               <a:ext uri="{28A0092B-C50C-407E-A947-70E740481C1C}">
                 <a14:useLocalDpi xmlns:a14="http://schemas.microsoft.com/office/drawing/2010/main" val="0"/>
@@ -9442,7 +9398,7 @@
           <p:nvPr/>
         </p:nvPicPr>
         <p:blipFill>
-          <a:blip r:embed="rId5">
+          <a:blip r:embed="rId6">
             <a:extLst>
               <a:ext uri="{28A0092B-C50C-407E-A947-70E740481C1C}">
                 <a14:useLocalDpi xmlns:a14="http://schemas.microsoft.com/office/drawing/2010/main" val="0"/>
@@ -9478,7 +9434,7 @@
           <p:nvPr/>
         </p:nvPicPr>
         <p:blipFill>
-          <a:blip r:embed="rId6">
+          <a:blip r:embed="rId7">
             <a:extLst>
               <a:ext uri="{28A0092B-C50C-407E-A947-70E740481C1C}">
                 <a14:useLocalDpi xmlns:a14="http://schemas.microsoft.com/office/drawing/2010/main" val="0"/>

</xml_diff>